<commit_message>
Adding departure analysis image
</commit_message>
<xml_diff>
--- a/presentation/Analise-decolagem-companhia-mes-uf.pptx
+++ b/presentation/Analise-decolagem-companhia-mes-uf.pptx
@@ -288,7 +288,8 @@
           <a:p>
             <a:fld id="{15ED354D-AA56-4B1F-A1D8-6F343D2F9B01}" type="datetimeFigureOut">
               <a:rPr lang="pt-BR" smtClean="0"/>
-              <a:t>12/09/2020</a:t>
+              <a:pPr/>
+              <a:t>15/09/2020</a:t>
             </a:fld>
             <a:endParaRPr lang="pt-BR"/>
           </a:p>
@@ -330,6 +331,7 @@
           <a:p>
             <a:fld id="{AF8AB0A4-5022-408F-A962-BC1E80E477A6}" type="slidenum">
               <a:rPr lang="pt-BR" smtClean="0"/>
+              <a:pPr/>
               <a:t>‹nº›</a:t>
             </a:fld>
             <a:endParaRPr lang="pt-BR"/>
@@ -453,7 +455,8 @@
           <a:p>
             <a:fld id="{15ED354D-AA56-4B1F-A1D8-6F343D2F9B01}" type="datetimeFigureOut">
               <a:rPr lang="pt-BR" smtClean="0"/>
-              <a:t>12/09/2020</a:t>
+              <a:pPr/>
+              <a:t>15/09/2020</a:t>
             </a:fld>
             <a:endParaRPr lang="pt-BR"/>
           </a:p>
@@ -495,6 +498,7 @@
           <a:p>
             <a:fld id="{AF8AB0A4-5022-408F-A962-BC1E80E477A6}" type="slidenum">
               <a:rPr lang="pt-BR" smtClean="0"/>
+              <a:pPr/>
               <a:t>‹nº›</a:t>
             </a:fld>
             <a:endParaRPr lang="pt-BR"/>
@@ -628,7 +632,8 @@
           <a:p>
             <a:fld id="{15ED354D-AA56-4B1F-A1D8-6F343D2F9B01}" type="datetimeFigureOut">
               <a:rPr lang="pt-BR" smtClean="0"/>
-              <a:t>12/09/2020</a:t>
+              <a:pPr/>
+              <a:t>15/09/2020</a:t>
             </a:fld>
             <a:endParaRPr lang="pt-BR"/>
           </a:p>
@@ -670,6 +675,7 @@
           <a:p>
             <a:fld id="{AF8AB0A4-5022-408F-A962-BC1E80E477A6}" type="slidenum">
               <a:rPr lang="pt-BR" smtClean="0"/>
+              <a:pPr/>
               <a:t>‹nº›</a:t>
             </a:fld>
             <a:endParaRPr lang="pt-BR"/>
@@ -793,7 +799,8 @@
           <a:p>
             <a:fld id="{15ED354D-AA56-4B1F-A1D8-6F343D2F9B01}" type="datetimeFigureOut">
               <a:rPr lang="pt-BR" smtClean="0"/>
-              <a:t>12/09/2020</a:t>
+              <a:pPr/>
+              <a:t>15/09/2020</a:t>
             </a:fld>
             <a:endParaRPr lang="pt-BR"/>
           </a:p>
@@ -835,6 +842,7 @@
           <a:p>
             <a:fld id="{AF8AB0A4-5022-408F-A962-BC1E80E477A6}" type="slidenum">
               <a:rPr lang="pt-BR" smtClean="0"/>
+              <a:pPr/>
               <a:t>‹nº›</a:t>
             </a:fld>
             <a:endParaRPr lang="pt-BR"/>
@@ -1034,7 +1042,8 @@
           <a:p>
             <a:fld id="{15ED354D-AA56-4B1F-A1D8-6F343D2F9B01}" type="datetimeFigureOut">
               <a:rPr lang="pt-BR" smtClean="0"/>
-              <a:t>12/09/2020</a:t>
+              <a:pPr/>
+              <a:t>15/09/2020</a:t>
             </a:fld>
             <a:endParaRPr lang="pt-BR"/>
           </a:p>
@@ -1076,6 +1085,7 @@
           <a:p>
             <a:fld id="{AF8AB0A4-5022-408F-A962-BC1E80E477A6}" type="slidenum">
               <a:rPr lang="pt-BR" smtClean="0"/>
+              <a:pPr/>
               <a:t>‹nº›</a:t>
             </a:fld>
             <a:endParaRPr lang="pt-BR"/>
@@ -1317,7 +1327,8 @@
           <a:p>
             <a:fld id="{15ED354D-AA56-4B1F-A1D8-6F343D2F9B01}" type="datetimeFigureOut">
               <a:rPr lang="pt-BR" smtClean="0"/>
-              <a:t>12/09/2020</a:t>
+              <a:pPr/>
+              <a:t>15/09/2020</a:t>
             </a:fld>
             <a:endParaRPr lang="pt-BR"/>
           </a:p>
@@ -1359,6 +1370,7 @@
           <a:p>
             <a:fld id="{AF8AB0A4-5022-408F-A962-BC1E80E477A6}" type="slidenum">
               <a:rPr lang="pt-BR" smtClean="0"/>
+              <a:pPr/>
               <a:t>‹nº›</a:t>
             </a:fld>
             <a:endParaRPr lang="pt-BR"/>
@@ -1734,7 +1746,8 @@
           <a:p>
             <a:fld id="{15ED354D-AA56-4B1F-A1D8-6F343D2F9B01}" type="datetimeFigureOut">
               <a:rPr lang="pt-BR" smtClean="0"/>
-              <a:t>12/09/2020</a:t>
+              <a:pPr/>
+              <a:t>15/09/2020</a:t>
             </a:fld>
             <a:endParaRPr lang="pt-BR"/>
           </a:p>
@@ -1776,6 +1789,7 @@
           <a:p>
             <a:fld id="{AF8AB0A4-5022-408F-A962-BC1E80E477A6}" type="slidenum">
               <a:rPr lang="pt-BR" smtClean="0"/>
+              <a:pPr/>
               <a:t>‹nº›</a:t>
             </a:fld>
             <a:endParaRPr lang="pt-BR"/>
@@ -1847,7 +1861,8 @@
           <a:p>
             <a:fld id="{15ED354D-AA56-4B1F-A1D8-6F343D2F9B01}" type="datetimeFigureOut">
               <a:rPr lang="pt-BR" smtClean="0"/>
-              <a:t>12/09/2020</a:t>
+              <a:pPr/>
+              <a:t>15/09/2020</a:t>
             </a:fld>
             <a:endParaRPr lang="pt-BR"/>
           </a:p>
@@ -1889,6 +1904,7 @@
           <a:p>
             <a:fld id="{AF8AB0A4-5022-408F-A962-BC1E80E477A6}" type="slidenum">
               <a:rPr lang="pt-BR" smtClean="0"/>
+              <a:pPr/>
               <a:t>‹nº›</a:t>
             </a:fld>
             <a:endParaRPr lang="pt-BR"/>
@@ -1937,7 +1953,8 @@
           <a:p>
             <a:fld id="{15ED354D-AA56-4B1F-A1D8-6F343D2F9B01}" type="datetimeFigureOut">
               <a:rPr lang="pt-BR" smtClean="0"/>
-              <a:t>12/09/2020</a:t>
+              <a:pPr/>
+              <a:t>15/09/2020</a:t>
             </a:fld>
             <a:endParaRPr lang="pt-BR"/>
           </a:p>
@@ -1979,6 +1996,7 @@
           <a:p>
             <a:fld id="{AF8AB0A4-5022-408F-A962-BC1E80E477A6}" type="slidenum">
               <a:rPr lang="pt-BR" smtClean="0"/>
+              <a:pPr/>
               <a:t>‹nº›</a:t>
             </a:fld>
             <a:endParaRPr lang="pt-BR"/>
@@ -2209,7 +2227,8 @@
           <a:p>
             <a:fld id="{15ED354D-AA56-4B1F-A1D8-6F343D2F9B01}" type="datetimeFigureOut">
               <a:rPr lang="pt-BR" smtClean="0"/>
-              <a:t>12/09/2020</a:t>
+              <a:pPr/>
+              <a:t>15/09/2020</a:t>
             </a:fld>
             <a:endParaRPr lang="pt-BR"/>
           </a:p>
@@ -2251,6 +2270,7 @@
           <a:p>
             <a:fld id="{AF8AB0A4-5022-408F-A962-BC1E80E477A6}" type="slidenum">
               <a:rPr lang="pt-BR" smtClean="0"/>
+              <a:pPr/>
               <a:t>‹nº›</a:t>
             </a:fld>
             <a:endParaRPr lang="pt-BR"/>
@@ -2457,7 +2477,8 @@
           <a:p>
             <a:fld id="{15ED354D-AA56-4B1F-A1D8-6F343D2F9B01}" type="datetimeFigureOut">
               <a:rPr lang="pt-BR" smtClean="0"/>
-              <a:t>12/09/2020</a:t>
+              <a:pPr/>
+              <a:t>15/09/2020</a:t>
             </a:fld>
             <a:endParaRPr lang="pt-BR"/>
           </a:p>
@@ -2499,6 +2520,7 @@
           <a:p>
             <a:fld id="{AF8AB0A4-5022-408F-A962-BC1E80E477A6}" type="slidenum">
               <a:rPr lang="pt-BR" smtClean="0"/>
+              <a:pPr/>
               <a:t>‹nº›</a:t>
             </a:fld>
             <a:endParaRPr lang="pt-BR"/>
@@ -2665,7 +2687,8 @@
           <a:p>
             <a:fld id="{15ED354D-AA56-4B1F-A1D8-6F343D2F9B01}" type="datetimeFigureOut">
               <a:rPr lang="pt-BR" smtClean="0"/>
-              <a:t>12/09/2020</a:t>
+              <a:pPr/>
+              <a:t>15/09/2020</a:t>
             </a:fld>
             <a:endParaRPr lang="pt-BR"/>
           </a:p>
@@ -2743,6 +2766,7 @@
           <a:p>
             <a:fld id="{AF8AB0A4-5022-408F-A962-BC1E80E477A6}" type="slidenum">
               <a:rPr lang="pt-BR" smtClean="0"/>
+              <a:pPr/>
               <a:t>‹nº›</a:t>
             </a:fld>
             <a:endParaRPr lang="pt-BR"/>
@@ -3035,53 +3059,356 @@
           <a:chExt cx="0" cy="0"/>
         </a:xfrm>
       </p:grpSpPr>
+      <p:sp>
+        <p:nvSpPr>
+          <p:cNvPr id="30" name="Retângulo 29"/>
+          <p:cNvSpPr/>
+          <p:nvPr/>
+        </p:nvSpPr>
+        <p:spPr>
+          <a:xfrm>
+            <a:off x="0" y="0"/>
+            <a:ext cx="9144000" cy="1556792"/>
+          </a:xfrm>
+          <a:prstGeom prst="rect">
+            <a:avLst/>
+          </a:prstGeom>
+          <a:solidFill>
+            <a:schemeClr val="bg1">
+              <a:lumMod val="95000"/>
+            </a:schemeClr>
+          </a:solidFill>
+          <a:ln>
+            <a:noFill/>
+          </a:ln>
+        </p:spPr>
+        <p:style>
+          <a:lnRef idx="2">
+            <a:schemeClr val="accent1">
+              <a:shade val="50000"/>
+            </a:schemeClr>
+          </a:lnRef>
+          <a:fillRef idx="1">
+            <a:schemeClr val="accent1"/>
+          </a:fillRef>
+          <a:effectRef idx="0">
+            <a:schemeClr val="accent1"/>
+          </a:effectRef>
+          <a:fontRef idx="minor">
+            <a:schemeClr val="lt1"/>
+          </a:fontRef>
+        </p:style>
+        <p:txBody>
+          <a:bodyPr rtlCol="0" anchor="ctr"/>
+          <a:lstStyle/>
+          <a:p>
+            <a:pPr algn="ctr"/>
+            <a:endParaRPr lang="pt-BR"/>
+          </a:p>
+        </p:txBody>
+      </p:sp>
+      <p:sp>
+        <p:nvSpPr>
+          <p:cNvPr id="24" name="CaixaDeTexto 23"/>
+          <p:cNvSpPr txBox="1"/>
+          <p:nvPr/>
+        </p:nvSpPr>
+        <p:spPr>
+          <a:xfrm>
+            <a:off x="283392" y="6453336"/>
+            <a:ext cx="5584752" cy="246221"/>
+          </a:xfrm>
+          <a:prstGeom prst="rect">
+            <a:avLst/>
+          </a:prstGeom>
+          <a:noFill/>
+        </p:spPr>
+        <p:txBody>
+          <a:bodyPr wrap="square" rtlCol="0">
+            <a:spAutoFit/>
+          </a:bodyPr>
+          <a:lstStyle/>
+          <a:p>
+            <a:r>
+              <a:rPr lang="pt-BR" sz="1000" i="1" u="sng" dirty="0" smtClean="0">
+                <a:solidFill>
+                  <a:srgbClr val="0070C0"/>
+                </a:solidFill>
+              </a:rPr>
+              <a:t>https://</a:t>
+            </a:r>
+            <a:r>
+              <a:rPr lang="pt-BR" sz="1000" i="1" u="sng" dirty="0" smtClean="0">
+                <a:solidFill>
+                  <a:srgbClr val="0070C0"/>
+                </a:solidFill>
+                <a:latin typeface="Roboto" pitchFamily="2" charset="0"/>
+                <a:ea typeface="Roboto" pitchFamily="2" charset="0"/>
+              </a:rPr>
+              <a:t>www.anac.gov.br/assuntos/dados-e-estatisticas/dados-estatisticos/dados-estatisticos</a:t>
+            </a:r>
+            <a:r>
+              <a:rPr lang="pt-BR" sz="1000" i="1" u="sng" dirty="0" smtClean="0">
+                <a:solidFill>
+                  <a:srgbClr val="0070C0"/>
+                </a:solidFill>
+              </a:rPr>
+              <a:t> </a:t>
+            </a:r>
+            <a:endParaRPr lang="pt-BR" sz="1000" i="1" u="sng" dirty="0">
+              <a:solidFill>
+                <a:srgbClr val="0070C0"/>
+              </a:solidFill>
+            </a:endParaRPr>
+          </a:p>
+        </p:txBody>
+      </p:sp>
+      <p:cxnSp>
+        <p:nvCxnSpPr>
+          <p:cNvPr id="26" name="Conector reto 25"/>
+          <p:cNvCxnSpPr/>
+          <p:nvPr/>
+        </p:nvCxnSpPr>
+        <p:spPr>
+          <a:xfrm>
+            <a:off x="395536" y="6165304"/>
+            <a:ext cx="2160240" cy="0"/>
+          </a:xfrm>
+          <a:prstGeom prst="line">
+            <a:avLst/>
+          </a:prstGeom>
+          <a:ln w="28575">
+            <a:solidFill>
+              <a:schemeClr val="tx1"/>
+            </a:solidFill>
+          </a:ln>
+        </p:spPr>
+        <p:style>
+          <a:lnRef idx="1">
+            <a:schemeClr val="accent1"/>
+          </a:lnRef>
+          <a:fillRef idx="0">
+            <a:schemeClr val="accent1"/>
+          </a:fillRef>
+          <a:effectRef idx="0">
+            <a:schemeClr val="accent1"/>
+          </a:effectRef>
+          <a:fontRef idx="minor">
+            <a:schemeClr val="tx1"/>
+          </a:fontRef>
+        </p:style>
+      </p:cxnSp>
+      <p:sp>
+        <p:nvSpPr>
+          <p:cNvPr id="27" name="Retângulo 26"/>
+          <p:cNvSpPr/>
+          <p:nvPr/>
+        </p:nvSpPr>
+        <p:spPr>
+          <a:xfrm>
+            <a:off x="300207" y="6237312"/>
+            <a:ext cx="1247457" cy="246221"/>
+          </a:xfrm>
+          <a:prstGeom prst="rect">
+            <a:avLst/>
+          </a:prstGeom>
+        </p:spPr>
+        <p:txBody>
+          <a:bodyPr wrap="none">
+            <a:spAutoFit/>
+          </a:bodyPr>
+          <a:lstStyle/>
+          <a:p>
+            <a:r>
+              <a:rPr lang="pt-BR" sz="1000" b="1" dirty="0" smtClean="0">
+                <a:solidFill>
+                  <a:schemeClr val="tx1">
+                    <a:lumMod val="85000"/>
+                    <a:lumOff val="15000"/>
+                  </a:schemeClr>
+                </a:solidFill>
+                <a:latin typeface="League Spartan" pitchFamily="50" charset="0"/>
+              </a:rPr>
+              <a:t>Fonte de </a:t>
+            </a:r>
+            <a:r>
+              <a:rPr lang="pt-BR" sz="1000" b="1" dirty="0" smtClean="0">
+                <a:solidFill>
+                  <a:schemeClr val="tx1">
+                    <a:lumMod val="85000"/>
+                    <a:lumOff val="15000"/>
+                  </a:schemeClr>
+                </a:solidFill>
+                <a:latin typeface="League Spartan" pitchFamily="50" charset="0"/>
+              </a:rPr>
+              <a:t>dados:</a:t>
+            </a:r>
+            <a:endParaRPr lang="pt-BR" sz="1000" b="1" dirty="0">
+              <a:solidFill>
+                <a:schemeClr val="tx1">
+                  <a:lumMod val="85000"/>
+                  <a:lumOff val="15000"/>
+                </a:schemeClr>
+              </a:solidFill>
+              <a:latin typeface="League Spartan" pitchFamily="50" charset="0"/>
+            </a:endParaRPr>
+          </a:p>
+        </p:txBody>
+      </p:sp>
+      <p:sp>
+        <p:nvSpPr>
+          <p:cNvPr id="28" name="Retângulo 27"/>
+          <p:cNvSpPr/>
+          <p:nvPr/>
+        </p:nvSpPr>
+        <p:spPr>
+          <a:xfrm>
+            <a:off x="7703610" y="5737651"/>
+            <a:ext cx="1277914" cy="230832"/>
+          </a:xfrm>
+          <a:prstGeom prst="rect">
+            <a:avLst/>
+          </a:prstGeom>
+        </p:spPr>
+        <p:txBody>
+          <a:bodyPr wrap="none">
+            <a:spAutoFit/>
+          </a:bodyPr>
+          <a:lstStyle/>
+          <a:p>
+            <a:pPr algn="r"/>
+            <a:r>
+              <a:rPr lang="pt-BR" sz="900" dirty="0" smtClean="0">
+                <a:solidFill>
+                  <a:schemeClr val="tx1">
+                    <a:lumMod val="85000"/>
+                    <a:lumOff val="15000"/>
+                  </a:schemeClr>
+                </a:solidFill>
+                <a:latin typeface="Roboto" pitchFamily="2" charset="0"/>
+                <a:ea typeface="Roboto" pitchFamily="2" charset="0"/>
+              </a:rPr>
+              <a:t>Elaborado pelo autor.</a:t>
+            </a:r>
+            <a:endParaRPr lang="pt-BR" sz="900" dirty="0">
+              <a:solidFill>
+                <a:schemeClr val="tx1">
+                  <a:lumMod val="85000"/>
+                  <a:lumOff val="15000"/>
+                </a:schemeClr>
+              </a:solidFill>
+              <a:latin typeface="Roboto" pitchFamily="2" charset="0"/>
+              <a:ea typeface="Roboto" pitchFamily="2" charset="0"/>
+            </a:endParaRPr>
+          </a:p>
+        </p:txBody>
+      </p:sp>
+      <p:sp>
+        <p:nvSpPr>
+          <p:cNvPr id="25" name="Retângulo 24"/>
+          <p:cNvSpPr/>
+          <p:nvPr/>
+        </p:nvSpPr>
+        <p:spPr>
+          <a:xfrm>
+            <a:off x="251520" y="404664"/>
+            <a:ext cx="5561074" cy="461665"/>
+          </a:xfrm>
+          <a:prstGeom prst="rect">
+            <a:avLst/>
+          </a:prstGeom>
+        </p:spPr>
+        <p:txBody>
+          <a:bodyPr wrap="none">
+            <a:spAutoFit/>
+          </a:bodyPr>
+          <a:lstStyle/>
+          <a:p>
+            <a:r>
+              <a:rPr lang="pt-BR" sz="2400" b="1" dirty="0" smtClean="0">
+                <a:solidFill>
+                  <a:schemeClr val="tx1">
+                    <a:lumMod val="85000"/>
+                    <a:lumOff val="15000"/>
+                  </a:schemeClr>
+                </a:solidFill>
+                <a:latin typeface="League Spartan" pitchFamily="50" charset="0"/>
+              </a:rPr>
+              <a:t>Evolução de Decolagens em 2020</a:t>
+            </a:r>
+            <a:endParaRPr lang="pt-BR" sz="2400" b="1" dirty="0">
+              <a:solidFill>
+                <a:schemeClr val="tx1">
+                  <a:lumMod val="85000"/>
+                  <a:lumOff val="15000"/>
+                </a:schemeClr>
+              </a:solidFill>
+              <a:latin typeface="League Spartan" pitchFamily="50" charset="0"/>
+            </a:endParaRPr>
+          </a:p>
+        </p:txBody>
+      </p:sp>
+      <p:sp>
+        <p:nvSpPr>
+          <p:cNvPr id="29" name="Retângulo 28"/>
+          <p:cNvSpPr/>
+          <p:nvPr/>
+        </p:nvSpPr>
+        <p:spPr>
+          <a:xfrm>
+            <a:off x="280236" y="836712"/>
+            <a:ext cx="4051109" cy="338554"/>
+          </a:xfrm>
+          <a:prstGeom prst="rect">
+            <a:avLst/>
+          </a:prstGeom>
+        </p:spPr>
+        <p:txBody>
+          <a:bodyPr wrap="none">
+            <a:spAutoFit/>
+          </a:bodyPr>
+          <a:lstStyle/>
+          <a:p>
+            <a:r>
+              <a:rPr lang="pt-BR" sz="1600" b="1" dirty="0" smtClean="0">
+                <a:solidFill>
+                  <a:schemeClr val="tx1">
+                    <a:lumMod val="85000"/>
+                    <a:lumOff val="15000"/>
+                  </a:schemeClr>
+                </a:solidFill>
+                <a:latin typeface="Roboto Thin" pitchFamily="2" charset="0"/>
+                <a:ea typeface="Roboto Thin" pitchFamily="2" charset="0"/>
+              </a:rPr>
+              <a:t>Análise por Companhia Aérea, Mês e Estado.</a:t>
+            </a:r>
+            <a:endParaRPr lang="pt-BR" sz="1600" b="1" dirty="0">
+              <a:solidFill>
+                <a:schemeClr val="tx1">
+                  <a:lumMod val="85000"/>
+                  <a:lumOff val="15000"/>
+                </a:schemeClr>
+              </a:solidFill>
+              <a:latin typeface="Roboto Thin" pitchFamily="2" charset="0"/>
+              <a:ea typeface="Roboto Thin" pitchFamily="2" charset="0"/>
+            </a:endParaRPr>
+          </a:p>
+        </p:txBody>
+      </p:sp>
       <p:grpSp>
         <p:nvGrpSpPr>
-          <p:cNvPr id="23" name="Grupo 22"/>
+          <p:cNvPr id="35" name="Grupo 34"/>
           <p:cNvGrpSpPr/>
           <p:nvPr/>
         </p:nvGrpSpPr>
         <p:grpSpPr>
           <a:xfrm>
-            <a:off x="179512" y="1412776"/>
-            <a:ext cx="8712968" cy="3888432"/>
-            <a:chOff x="179512" y="548680"/>
-            <a:chExt cx="8712968" cy="3888432"/>
+            <a:off x="251520" y="1772816"/>
+            <a:ext cx="8640960" cy="3820819"/>
+            <a:chOff x="251520" y="1844824"/>
+            <a:chExt cx="8640960" cy="3820819"/>
           </a:xfrm>
         </p:grpSpPr>
-        <p:pic>
-          <p:nvPicPr>
-            <p:cNvPr id="1027" name="Picture 3"/>
-            <p:cNvPicPr>
-              <a:picLocks noChangeAspect="1" noChangeArrowheads="1"/>
-            </p:cNvPicPr>
-            <p:nvPr/>
-          </p:nvPicPr>
-          <p:blipFill>
-            <a:blip r:embed="rId2" cstate="print"/>
-            <a:srcRect/>
-            <a:stretch>
-              <a:fillRect/>
-            </a:stretch>
-          </p:blipFill>
-          <p:spPr bwMode="auto">
-            <a:xfrm>
-              <a:off x="179512" y="548680"/>
-              <a:ext cx="1233580" cy="1368152"/>
-            </a:xfrm>
-            <a:prstGeom prst="rect">
-              <a:avLst/>
-            </a:prstGeom>
-            <a:noFill/>
-            <a:ln w="9525">
-              <a:noFill/>
-              <a:miter lim="800000"/>
-              <a:headEnd/>
-              <a:tailEnd/>
-            </a:ln>
-            <a:effectLst/>
-          </p:spPr>
-        </p:pic>
         <p:grpSp>
           <p:nvGrpSpPr>
             <p:cNvPr id="22" name="Grupo 21"/>
@@ -3090,10 +3417,10 @@
           </p:nvGrpSpPr>
           <p:grpSpPr>
             <a:xfrm>
-              <a:off x="1547664" y="631721"/>
-              <a:ext cx="7344816" cy="3805391"/>
-              <a:chOff x="1547664" y="620688"/>
-              <a:chExt cx="7596336" cy="3949407"/>
+              <a:off x="1673922" y="1919327"/>
+              <a:ext cx="7218558" cy="3746316"/>
+              <a:chOff x="1552771" y="620688"/>
+              <a:chExt cx="7591229" cy="3953442"/>
             </a:xfrm>
           </p:grpSpPr>
           <p:pic>
@@ -3105,7 +3432,7 @@
               <p:nvPr/>
             </p:nvPicPr>
             <p:blipFill>
-              <a:blip r:embed="rId3" cstate="print"/>
+              <a:blip r:embed="rId2" cstate="print"/>
               <a:srcRect/>
               <a:stretch>
                 <a:fillRect/>
@@ -3137,8 +3464,8 @@
             </p:nvSpPr>
             <p:spPr>
               <a:xfrm rot="16200000">
-                <a:off x="1456546" y="3469832"/>
-                <a:ext cx="451383" cy="269148"/>
+                <a:off x="1429170" y="3474940"/>
+                <a:ext cx="506135" cy="258933"/>
               </a:xfrm>
               <a:prstGeom prst="rect">
                 <a:avLst/>
@@ -3152,10 +3479,26 @@
               <a:lstStyle/>
               <a:p>
                 <a:r>
-                  <a:rPr lang="pt-BR" sz="1200" b="1" dirty="0" smtClean="0"/>
+                  <a:rPr lang="pt-BR" sz="1000" b="1" dirty="0" smtClean="0">
+                    <a:solidFill>
+                      <a:schemeClr val="tx1">
+                        <a:lumMod val="85000"/>
+                        <a:lumOff val="15000"/>
+                      </a:schemeClr>
+                    </a:solidFill>
+                    <a:latin typeface="League Spartan" pitchFamily="50" charset="0"/>
+                  </a:rPr>
                   <a:t>Azul</a:t>
                 </a:r>
-                <a:endParaRPr lang="pt-BR" sz="1200" b="1" dirty="0"/>
+                <a:endParaRPr lang="pt-BR" sz="1000" b="1" dirty="0">
+                  <a:solidFill>
+                    <a:schemeClr val="tx1">
+                      <a:lumMod val="85000"/>
+                      <a:lumOff val="15000"/>
+                    </a:schemeClr>
+                  </a:solidFill>
+                  <a:latin typeface="League Spartan" pitchFamily="50" charset="0"/>
+                </a:endParaRPr>
               </a:p>
             </p:txBody>
           </p:sp>
@@ -3167,8 +3510,8 @@
             </p:nvSpPr>
             <p:spPr>
               <a:xfrm rot="16200000">
-                <a:off x="1483719" y="2099005"/>
-                <a:ext cx="397039" cy="269148"/>
+                <a:off x="1463850" y="2104113"/>
+                <a:ext cx="436779" cy="258933"/>
               </a:xfrm>
               <a:prstGeom prst="rect">
                 <a:avLst/>
@@ -3182,10 +3525,26 @@
               <a:lstStyle/>
               <a:p>
                 <a:r>
-                  <a:rPr lang="pt-BR" sz="1200" b="1" dirty="0" smtClean="0"/>
+                  <a:rPr lang="pt-BR" sz="1000" b="1" dirty="0" smtClean="0">
+                    <a:solidFill>
+                      <a:schemeClr val="tx1">
+                        <a:lumMod val="85000"/>
+                        <a:lumOff val="15000"/>
+                      </a:schemeClr>
+                    </a:solidFill>
+                    <a:latin typeface="League Spartan" pitchFamily="50" charset="0"/>
+                  </a:rPr>
                   <a:t>Gol</a:t>
                 </a:r>
-                <a:endParaRPr lang="pt-BR" sz="1200" b="1" dirty="0"/>
+                <a:endParaRPr lang="pt-BR" sz="1000" b="1" dirty="0">
+                  <a:solidFill>
+                    <a:schemeClr val="tx1">
+                      <a:lumMod val="85000"/>
+                      <a:lumOff val="15000"/>
+                    </a:schemeClr>
+                  </a:solidFill>
+                  <a:latin typeface="League Spartan" pitchFamily="50" charset="0"/>
+                </a:endParaRPr>
               </a:p>
             </p:txBody>
           </p:sp>
@@ -3197,8 +3556,8 @@
             </p:nvSpPr>
             <p:spPr>
               <a:xfrm rot="16200000">
-                <a:off x="1399337" y="826070"/>
-                <a:ext cx="565804" cy="269148"/>
+                <a:off x="1359814" y="831178"/>
+                <a:ext cx="644850" cy="258933"/>
               </a:xfrm>
               <a:prstGeom prst="rect">
                 <a:avLst/>
@@ -3212,10 +3571,26 @@
               <a:lstStyle/>
               <a:p>
                 <a:r>
-                  <a:rPr lang="pt-BR" sz="1200" b="1" dirty="0" smtClean="0"/>
+                  <a:rPr lang="pt-BR" sz="1000" b="1" dirty="0" smtClean="0">
+                    <a:solidFill>
+                      <a:schemeClr val="tx1">
+                        <a:lumMod val="85000"/>
+                        <a:lumOff val="15000"/>
+                      </a:schemeClr>
+                    </a:solidFill>
+                    <a:latin typeface="League Spartan" pitchFamily="50" charset="0"/>
+                  </a:rPr>
                   <a:t>Latam</a:t>
                 </a:r>
-                <a:endParaRPr lang="pt-BR" sz="1200" b="1" dirty="0"/>
+                <a:endParaRPr lang="pt-BR" sz="1000" b="1" dirty="0">
+                  <a:solidFill>
+                    <a:schemeClr val="tx1">
+                      <a:lumMod val="85000"/>
+                      <a:lumOff val="15000"/>
+                    </a:schemeClr>
+                  </a:solidFill>
+                  <a:latin typeface="League Spartan" pitchFamily="50" charset="0"/>
+                </a:endParaRPr>
               </a:p>
             </p:txBody>
           </p:sp>
@@ -3228,7 +3603,7 @@
             <p:spPr>
               <a:xfrm>
                 <a:off x="2149958" y="4298056"/>
-                <a:ext cx="377243" cy="272039"/>
+                <a:ext cx="433577" cy="276074"/>
               </a:xfrm>
               <a:prstGeom prst="rect">
                 <a:avLst/>
@@ -3242,10 +3617,28 @@
               <a:lstStyle/>
               <a:p>
                 <a:r>
-                  <a:rPr lang="pt-BR" sz="1200" dirty="0" smtClean="0"/>
+                  <a:rPr lang="pt-BR" sz="1100" dirty="0" smtClean="0">
+                    <a:solidFill>
+                      <a:schemeClr val="tx1">
+                        <a:lumMod val="85000"/>
+                        <a:lumOff val="15000"/>
+                      </a:schemeClr>
+                    </a:solidFill>
+                    <a:latin typeface="Roboto Light" pitchFamily="2" charset="0"/>
+                    <a:ea typeface="Roboto Light" pitchFamily="2" charset="0"/>
+                  </a:rPr>
                   <a:t>Jan</a:t>
                 </a:r>
-                <a:endParaRPr lang="pt-BR" sz="1200" dirty="0"/>
+                <a:endParaRPr lang="pt-BR" sz="1100" dirty="0">
+                  <a:solidFill>
+                    <a:schemeClr val="tx1">
+                      <a:lumMod val="85000"/>
+                      <a:lumOff val="15000"/>
+                    </a:schemeClr>
+                  </a:solidFill>
+                  <a:latin typeface="Roboto Light" pitchFamily="2" charset="0"/>
+                  <a:ea typeface="Roboto Light" pitchFamily="2" charset="0"/>
+                </a:endParaRPr>
               </a:p>
             </p:txBody>
           </p:sp>
@@ -3258,7 +3651,7 @@
             <p:spPr>
               <a:xfrm>
                 <a:off x="3189931" y="4298056"/>
-                <a:ext cx="386775" cy="272039"/>
+                <a:ext cx="423463" cy="276074"/>
               </a:xfrm>
               <a:prstGeom prst="rect">
                 <a:avLst/>
@@ -3272,10 +3665,28 @@
               <a:lstStyle/>
               <a:p>
                 <a:r>
-                  <a:rPr lang="pt-BR" sz="1200" dirty="0" smtClean="0"/>
+                  <a:rPr lang="pt-BR" sz="1100" dirty="0" smtClean="0">
+                    <a:solidFill>
+                      <a:schemeClr val="tx1">
+                        <a:lumMod val="85000"/>
+                        <a:lumOff val="15000"/>
+                      </a:schemeClr>
+                    </a:solidFill>
+                    <a:latin typeface="Roboto Light" pitchFamily="2" charset="0"/>
+                    <a:ea typeface="Roboto Light" pitchFamily="2" charset="0"/>
+                  </a:rPr>
                   <a:t>Fev</a:t>
                 </a:r>
-                <a:endParaRPr lang="pt-BR" sz="1200" dirty="0"/>
+                <a:endParaRPr lang="pt-BR" sz="1100" dirty="0">
+                  <a:solidFill>
+                    <a:schemeClr val="tx1">
+                      <a:lumMod val="85000"/>
+                      <a:lumOff val="15000"/>
+                    </a:schemeClr>
+                  </a:solidFill>
+                  <a:latin typeface="Roboto Light" pitchFamily="2" charset="0"/>
+                  <a:ea typeface="Roboto Light" pitchFamily="2" charset="0"/>
+                </a:endParaRPr>
               </a:p>
             </p:txBody>
           </p:sp>
@@ -3288,7 +3699,7 @@
             <p:spPr>
               <a:xfrm>
                 <a:off x="4211960" y="4298056"/>
-                <a:ext cx="430201" cy="272039"/>
+                <a:ext cx="452122" cy="276074"/>
               </a:xfrm>
               <a:prstGeom prst="rect">
                 <a:avLst/>
@@ -3302,10 +3713,28 @@
               <a:lstStyle/>
               <a:p>
                 <a:r>
-                  <a:rPr lang="pt-BR" sz="1200" dirty="0" smtClean="0"/>
+                  <a:rPr lang="pt-BR" sz="1100" dirty="0" smtClean="0">
+                    <a:solidFill>
+                      <a:schemeClr val="tx1">
+                        <a:lumMod val="85000"/>
+                        <a:lumOff val="15000"/>
+                      </a:schemeClr>
+                    </a:solidFill>
+                    <a:latin typeface="Roboto Light" pitchFamily="2" charset="0"/>
+                    <a:ea typeface="Roboto Light" pitchFamily="2" charset="0"/>
+                  </a:rPr>
                   <a:t>Mar</a:t>
                 </a:r>
-                <a:endParaRPr lang="pt-BR" sz="1200" dirty="0"/>
+                <a:endParaRPr lang="pt-BR" sz="1100" dirty="0">
+                  <a:solidFill>
+                    <a:schemeClr val="tx1">
+                      <a:lumMod val="85000"/>
+                      <a:lumOff val="15000"/>
+                    </a:schemeClr>
+                  </a:solidFill>
+                  <a:latin typeface="Roboto Light" pitchFamily="2" charset="0"/>
+                  <a:ea typeface="Roboto Light" pitchFamily="2" charset="0"/>
+                </a:endParaRPr>
               </a:p>
             </p:txBody>
           </p:sp>
@@ -3318,7 +3747,7 @@
             <p:spPr>
               <a:xfrm>
                 <a:off x="5292080" y="4298056"/>
-                <a:ext cx="395934" cy="272039"/>
+                <a:ext cx="420091" cy="276074"/>
               </a:xfrm>
               <a:prstGeom prst="rect">
                 <a:avLst/>
@@ -3332,10 +3761,28 @@
               <a:lstStyle/>
               <a:p>
                 <a:r>
-                  <a:rPr lang="pt-BR" sz="1200" dirty="0" smtClean="0"/>
+                  <a:rPr lang="pt-BR" sz="1100" dirty="0" smtClean="0">
+                    <a:solidFill>
+                      <a:schemeClr val="tx1">
+                        <a:lumMod val="85000"/>
+                        <a:lumOff val="15000"/>
+                      </a:schemeClr>
+                    </a:solidFill>
+                    <a:latin typeface="Roboto Light" pitchFamily="2" charset="0"/>
+                    <a:ea typeface="Roboto Light" pitchFamily="2" charset="0"/>
+                  </a:rPr>
                   <a:t>Abr</a:t>
                 </a:r>
-                <a:endParaRPr lang="pt-BR" sz="1200" dirty="0"/>
+                <a:endParaRPr lang="pt-BR" sz="1100" dirty="0">
+                  <a:solidFill>
+                    <a:schemeClr val="tx1">
+                      <a:lumMod val="85000"/>
+                      <a:lumOff val="15000"/>
+                    </a:schemeClr>
+                  </a:solidFill>
+                  <a:latin typeface="Roboto Light" pitchFamily="2" charset="0"/>
+                  <a:ea typeface="Roboto Light" pitchFamily="2" charset="0"/>
+                </a:endParaRPr>
               </a:p>
             </p:txBody>
           </p:sp>
@@ -3348,7 +3795,7 @@
             <p:spPr>
               <a:xfrm>
                 <a:off x="6372200" y="4298056"/>
-                <a:ext cx="413066" cy="272039"/>
+                <a:ext cx="435264" cy="276074"/>
               </a:xfrm>
               <a:prstGeom prst="rect">
                 <a:avLst/>
@@ -3362,10 +3809,28 @@
               <a:lstStyle/>
               <a:p>
                 <a:r>
-                  <a:rPr lang="pt-BR" sz="1200" dirty="0" smtClean="0"/>
+                  <a:rPr lang="pt-BR" sz="1100" dirty="0" smtClean="0">
+                    <a:solidFill>
+                      <a:schemeClr val="tx1">
+                        <a:lumMod val="85000"/>
+                        <a:lumOff val="15000"/>
+                      </a:schemeClr>
+                    </a:solidFill>
+                    <a:latin typeface="Roboto Light" pitchFamily="2" charset="0"/>
+                    <a:ea typeface="Roboto Light" pitchFamily="2" charset="0"/>
+                  </a:rPr>
                   <a:t>Mai</a:t>
                 </a:r>
-                <a:endParaRPr lang="pt-BR" sz="1200" dirty="0"/>
+                <a:endParaRPr lang="pt-BR" sz="1100" dirty="0">
+                  <a:solidFill>
+                    <a:schemeClr val="tx1">
+                      <a:lumMod val="85000"/>
+                      <a:lumOff val="15000"/>
+                    </a:schemeClr>
+                  </a:solidFill>
+                  <a:latin typeface="Roboto Light" pitchFamily="2" charset="0"/>
+                  <a:ea typeface="Roboto Light" pitchFamily="2" charset="0"/>
+                </a:endParaRPr>
               </a:p>
             </p:txBody>
           </p:sp>
@@ -3378,7 +3843,7 @@
             <p:spPr>
               <a:xfrm>
                 <a:off x="7428886" y="4298056"/>
-                <a:ext cx="383474" cy="272039"/>
+                <a:ext cx="436949" cy="276074"/>
               </a:xfrm>
               <a:prstGeom prst="rect">
                 <a:avLst/>
@@ -3392,10 +3857,28 @@
               <a:lstStyle/>
               <a:p>
                 <a:r>
-                  <a:rPr lang="pt-BR" sz="1200" dirty="0" smtClean="0"/>
+                  <a:rPr lang="pt-BR" sz="1100" dirty="0" smtClean="0">
+                    <a:solidFill>
+                      <a:schemeClr val="tx1">
+                        <a:lumMod val="85000"/>
+                        <a:lumOff val="15000"/>
+                      </a:schemeClr>
+                    </a:solidFill>
+                    <a:latin typeface="Roboto Light" pitchFamily="2" charset="0"/>
+                    <a:ea typeface="Roboto Light" pitchFamily="2" charset="0"/>
+                  </a:rPr>
                   <a:t>Jun</a:t>
                 </a:r>
-                <a:endParaRPr lang="pt-BR" sz="1200" dirty="0"/>
+                <a:endParaRPr lang="pt-BR" sz="1100" dirty="0">
+                  <a:solidFill>
+                    <a:schemeClr val="tx1">
+                      <a:lumMod val="85000"/>
+                      <a:lumOff val="15000"/>
+                    </a:schemeClr>
+                  </a:solidFill>
+                  <a:latin typeface="Roboto Light" pitchFamily="2" charset="0"/>
+                  <a:ea typeface="Roboto Light" pitchFamily="2" charset="0"/>
+                </a:endParaRPr>
               </a:p>
             </p:txBody>
           </p:sp>
@@ -3408,7 +3891,7 @@
             <p:spPr>
               <a:xfrm>
                 <a:off x="8532440" y="4298056"/>
-                <a:ext cx="339862" cy="272039"/>
+                <a:ext cx="386376" cy="276074"/>
               </a:xfrm>
               <a:prstGeom prst="rect">
                 <a:avLst/>
@@ -3422,10 +3905,28 @@
               <a:lstStyle/>
               <a:p>
                 <a:r>
-                  <a:rPr lang="pt-BR" sz="1200" dirty="0" smtClean="0"/>
+                  <a:rPr lang="pt-BR" sz="1100" dirty="0" smtClean="0">
+                    <a:solidFill>
+                      <a:schemeClr val="tx1">
+                        <a:lumMod val="85000"/>
+                        <a:lumOff val="15000"/>
+                      </a:schemeClr>
+                    </a:solidFill>
+                    <a:latin typeface="Roboto Light" pitchFamily="2" charset="0"/>
+                    <a:ea typeface="Roboto Light" pitchFamily="2" charset="0"/>
+                  </a:rPr>
                   <a:t>Jul</a:t>
                 </a:r>
-                <a:endParaRPr lang="pt-BR" sz="1200" dirty="0"/>
+                <a:endParaRPr lang="pt-BR" sz="1100" dirty="0">
+                  <a:solidFill>
+                    <a:schemeClr val="tx1">
+                      <a:lumMod val="85000"/>
+                      <a:lumOff val="15000"/>
+                    </a:schemeClr>
+                  </a:solidFill>
+                  <a:latin typeface="Roboto Light" pitchFamily="2" charset="0"/>
+                  <a:ea typeface="Roboto Light" pitchFamily="2" charset="0"/>
+                </a:endParaRPr>
               </a:p>
             </p:txBody>
           </p:sp>
@@ -3438,7 +3939,7 @@
               <p:nvPr/>
             </p:nvPicPr>
             <p:blipFill>
-              <a:blip r:embed="rId4" cstate="print"/>
+              <a:blip r:embed="rId3" cstate="print"/>
               <a:srcRect/>
               <a:stretch>
                 <a:fillRect/>
@@ -3463,139 +3964,85 @@
             </p:spPr>
           </p:pic>
         </p:grpSp>
+        <p:sp>
+          <p:nvSpPr>
+            <p:cNvPr id="33" name="Retângulo 32"/>
+            <p:cNvSpPr/>
+            <p:nvPr/>
+          </p:nvSpPr>
+          <p:spPr>
+            <a:xfrm>
+              <a:off x="251520" y="1844824"/>
+              <a:ext cx="942887" cy="246221"/>
+            </a:xfrm>
+            <a:prstGeom prst="rect">
+              <a:avLst/>
+            </a:prstGeom>
+          </p:spPr>
+          <p:txBody>
+            <a:bodyPr wrap="none">
+              <a:spAutoFit/>
+            </a:bodyPr>
+            <a:lstStyle/>
+            <a:p>
+              <a:r>
+                <a:rPr lang="pt-BR" sz="1000" b="1" dirty="0" smtClean="0">
+                  <a:solidFill>
+                    <a:schemeClr val="tx1">
+                      <a:lumMod val="85000"/>
+                      <a:lumOff val="15000"/>
+                    </a:schemeClr>
+                  </a:solidFill>
+                  <a:latin typeface="League Spartan" pitchFamily="50" charset="0"/>
+                </a:rPr>
+                <a:t>Decolagens</a:t>
+              </a:r>
+              <a:endParaRPr lang="pt-BR" sz="1000" b="1" dirty="0">
+                <a:solidFill>
+                  <a:schemeClr val="tx1">
+                    <a:lumMod val="85000"/>
+                    <a:lumOff val="15000"/>
+                  </a:schemeClr>
+                </a:solidFill>
+                <a:latin typeface="League Spartan" pitchFamily="50" charset="0"/>
+              </a:endParaRPr>
+            </a:p>
+          </p:txBody>
+        </p:sp>
+        <p:pic>
+          <p:nvPicPr>
+            <p:cNvPr id="2" name="Picture 2"/>
+            <p:cNvPicPr>
+              <a:picLocks noChangeAspect="1" noChangeArrowheads="1"/>
+            </p:cNvPicPr>
+            <p:nvPr/>
+          </p:nvPicPr>
+          <p:blipFill>
+            <a:blip r:embed="rId4" cstate="print"/>
+            <a:srcRect/>
+            <a:stretch>
+              <a:fillRect/>
+            </a:stretch>
+          </p:blipFill>
+          <p:spPr bwMode="auto">
+            <a:xfrm>
+              <a:off x="323528" y="2046734"/>
+              <a:ext cx="1266825" cy="1238250"/>
+            </a:xfrm>
+            <a:prstGeom prst="rect">
+              <a:avLst/>
+            </a:prstGeom>
+            <a:noFill/>
+            <a:ln w="9525">
+              <a:noFill/>
+              <a:miter lim="800000"/>
+              <a:headEnd/>
+              <a:tailEnd/>
+            </a:ln>
+            <a:effectLst/>
+          </p:spPr>
+        </p:pic>
       </p:grpSp>
-      <p:sp>
-        <p:nvSpPr>
-          <p:cNvPr id="24" name="CaixaDeTexto 23"/>
-          <p:cNvSpPr txBox="1"/>
-          <p:nvPr/>
-        </p:nvSpPr>
-        <p:spPr>
-          <a:xfrm>
-            <a:off x="143953" y="6392361"/>
-            <a:ext cx="6012223" cy="276999"/>
-          </a:xfrm>
-          <a:prstGeom prst="rect">
-            <a:avLst/>
-          </a:prstGeom>
-          <a:noFill/>
-        </p:spPr>
-        <p:txBody>
-          <a:bodyPr wrap="none" rtlCol="0">
-            <a:spAutoFit/>
-          </a:bodyPr>
-          <a:lstStyle/>
-          <a:p>
-            <a:r>
-              <a:rPr lang="pt-BR" sz="1200" i="1" u="sng" dirty="0" smtClean="0">
-                <a:solidFill>
-                  <a:srgbClr val="0070C0"/>
-                </a:solidFill>
-              </a:rPr>
-              <a:t>https://www.anac.gov.br/assuntos/dados-e-estatisticas/dados-estatisticos/dados-estatisticos </a:t>
-            </a:r>
-            <a:endParaRPr lang="pt-BR" sz="1200" i="1" u="sng" dirty="0">
-              <a:solidFill>
-                <a:srgbClr val="0070C0"/>
-              </a:solidFill>
-            </a:endParaRPr>
-          </a:p>
-        </p:txBody>
-      </p:sp>
-      <p:cxnSp>
-        <p:nvCxnSpPr>
-          <p:cNvPr id="26" name="Conector reto 25"/>
-          <p:cNvCxnSpPr/>
-          <p:nvPr/>
-        </p:nvCxnSpPr>
-        <p:spPr>
-          <a:xfrm>
-            <a:off x="251520" y="6093296"/>
-            <a:ext cx="2160240" cy="0"/>
-          </a:xfrm>
-          <a:prstGeom prst="line">
-            <a:avLst/>
-          </a:prstGeom>
-          <a:ln w="28575">
-            <a:solidFill>
-              <a:schemeClr val="tx1"/>
-            </a:solidFill>
-          </a:ln>
-        </p:spPr>
-        <p:style>
-          <a:lnRef idx="1">
-            <a:schemeClr val="accent1"/>
-          </a:lnRef>
-          <a:fillRef idx="0">
-            <a:schemeClr val="accent1"/>
-          </a:fillRef>
-          <a:effectRef idx="0">
-            <a:schemeClr val="accent1"/>
-          </a:effectRef>
-          <a:fontRef idx="minor">
-            <a:schemeClr val="tx1"/>
-          </a:fontRef>
-        </p:style>
-      </p:cxnSp>
-      <p:sp>
-        <p:nvSpPr>
-          <p:cNvPr id="27" name="Retângulo 26"/>
-          <p:cNvSpPr/>
-          <p:nvPr/>
-        </p:nvSpPr>
-        <p:spPr>
-          <a:xfrm>
-            <a:off x="143953" y="6165304"/>
-            <a:ext cx="1240724" cy="276999"/>
-          </a:xfrm>
-          <a:prstGeom prst="rect">
-            <a:avLst/>
-          </a:prstGeom>
-        </p:spPr>
-        <p:txBody>
-          <a:bodyPr wrap="none">
-            <a:spAutoFit/>
-          </a:bodyPr>
-          <a:lstStyle/>
-          <a:p>
-            <a:r>
-              <a:rPr lang="pt-BR" sz="1200" b="1" dirty="0" smtClean="0"/>
-              <a:t>Fonte de dados:</a:t>
-            </a:r>
-            <a:endParaRPr lang="pt-BR" sz="1200" b="1" dirty="0"/>
-          </a:p>
-        </p:txBody>
-      </p:sp>
-      <p:sp>
-        <p:nvSpPr>
-          <p:cNvPr id="28" name="Retângulo 27"/>
-          <p:cNvSpPr/>
-          <p:nvPr/>
-        </p:nvSpPr>
-        <p:spPr>
-          <a:xfrm>
-            <a:off x="7668344" y="5517232"/>
-            <a:ext cx="1313180" cy="246221"/>
-          </a:xfrm>
-          <a:prstGeom prst="rect">
-            <a:avLst/>
-          </a:prstGeom>
-        </p:spPr>
-        <p:txBody>
-          <a:bodyPr wrap="none">
-            <a:spAutoFit/>
-          </a:bodyPr>
-          <a:lstStyle/>
-          <a:p>
-            <a:pPr algn="r"/>
-            <a:r>
-              <a:rPr lang="pt-BR" sz="1000" dirty="0" smtClean="0"/>
-              <a:t>Elaborado pelo autor.</a:t>
-            </a:r>
-            <a:endParaRPr lang="pt-BR" sz="1000" dirty="0"/>
-          </a:p>
-        </p:txBody>
-      </p:sp>
     </p:spTree>
   </p:cSld>
   <p:clrMapOvr>

</xml_diff>